<commit_message>
Update WP6 18th months review.pptx
</commit_message>
<xml_diff>
--- a/Work Packages/WP9 Outreach and communication/Presentations/M18 Review Meeting/WP6 18th months review.pptx
+++ b/Work Packages/WP9 Outreach and communication/Presentations/M18 Review Meeting/WP6 18th months review.pptx
@@ -15619,15 +15619,7 @@
             </a:r>
             <a:r>
               <a:rPr lang="en-US" dirty="0" smtClean="0"/>
-              <a:t> use case (archive</a:t>
-            </a:r>
-            <a:r>
-              <a:rPr lang="en-US" dirty="0" smtClean="0"/>
-              <a:t>): </a:t>
-            </a:r>
-            <a:r>
-              <a:rPr lang="en-US" dirty="0" smtClean="0"/>
-              <a:t>well advance, most technical solutions are in place – currently implementation of a file distribution catalogue (</a:t>
+              <a:t> use case (archive): well advance, most technical solutions are in place – currently implementation of a file distribution catalogue (</a:t>
             </a:r>
             <a:r>
               <a:rPr lang="en-US" dirty="0" err="1" smtClean="0"/>
@@ -15650,45 +15642,13 @@
             </a:r>
             <a:r>
               <a:rPr lang="en-US" dirty="0" smtClean="0"/>
-              <a:t> use case </a:t>
-            </a:r>
-            <a:r>
-              <a:rPr lang="en-US" dirty="0" smtClean="0"/>
-              <a:t>(user </a:t>
-            </a:r>
-            <a:r>
-              <a:rPr lang="en-US" dirty="0" smtClean="0"/>
-              <a:t>driven transfer</a:t>
-            </a:r>
-            <a:r>
-              <a:rPr lang="en-US" dirty="0" smtClean="0"/>
-              <a:t>): </a:t>
-            </a:r>
-            <a:r>
-              <a:rPr lang="en-US" dirty="0" smtClean="0"/>
-              <a:t>discussion with EGI and Globus </a:t>
-            </a:r>
-            <a:r>
-              <a:rPr lang="en-US" dirty="0" smtClean="0"/>
-              <a:t>ongoing </a:t>
-            </a:r>
-            <a:r>
-              <a:rPr lang="en-US" dirty="0" smtClean="0"/>
-              <a:t>(privacy, security, business model)</a:t>
+              <a:t> use case (user driven transfer): discussion with EGI and Globus ongoing (privacy, security, business model)</a:t>
             </a:r>
           </a:p>
           <a:p>
             <a:r>
               <a:rPr lang="en-US" dirty="0" smtClean="0"/>
-              <a:t>Software catalogue: requirements from the community collected, </a:t>
-            </a:r>
-            <a:r>
-              <a:rPr lang="en-US" dirty="0" smtClean="0"/>
-              <a:t>developments </a:t>
-            </a:r>
-            <a:r>
-              <a:rPr lang="en-US" dirty="0" smtClean="0"/>
-              <a:t>are going to start.</a:t>
+              <a:t>Software catalogue: requirements from the community collected, developments are going to start.</a:t>
             </a:r>
           </a:p>
           <a:p>
@@ -15702,19 +15662,7 @@
             </a:r>
             <a:r>
               <a:rPr lang="en-US" dirty="0" smtClean="0"/>
-              <a:t> </a:t>
-            </a:r>
-            <a:r>
-              <a:rPr lang="en-US" dirty="0" smtClean="0"/>
-              <a:t>services, </a:t>
-            </a:r>
-            <a:r>
-              <a:rPr lang="en-US" dirty="0" smtClean="0"/>
-              <a:t>2 services </a:t>
-            </a:r>
-            <a:r>
-              <a:rPr lang="en-US" dirty="0" smtClean="0"/>
-              <a:t>ready:</a:t>
+              <a:t> services, 2 services ready:</a:t>
             </a:r>
           </a:p>
           <a:p>
@@ -15728,11 +15676,7 @@
             <a:pPr lvl="1"/>
             <a:r>
               <a:rPr lang="en-US" dirty="0" smtClean="0"/>
-              <a:t>E-</a:t>
-            </a:r>
-            <a:r>
-              <a:rPr lang="en-US" dirty="0" smtClean="0"/>
-              <a:t>Learning platform</a:t>
+              <a:t>E-Learning platform</a:t>
             </a:r>
             <a:r>
               <a:rPr lang="en-US" dirty="0"/>
@@ -15992,7 +15936,6 @@
               <a:rPr lang="en-GB" dirty="0" smtClean="0"/>
               <a:t> </a:t>
             </a:r>
-            <a:endParaRPr lang="en-GB" dirty="0" smtClean="0"/>
           </a:p>
           <a:p>
             <a:r>
@@ -16003,19 +15946,7 @@
           <a:p>
             <a:r>
               <a:rPr lang="en-GB" dirty="0" smtClean="0"/>
-              <a:t>System/network </a:t>
-            </a:r>
-            <a:r>
-              <a:rPr lang="en-GB" dirty="0" smtClean="0"/>
-              <a:t>admin </a:t>
-            </a:r>
-            <a:r>
-              <a:rPr lang="en-GB" dirty="0" smtClean="0"/>
-              <a:t>job </a:t>
-            </a:r>
-            <a:r>
-              <a:rPr lang="en-GB" dirty="0" smtClean="0"/>
-              <a:t>market </a:t>
+              <a:t>System/network admin job market </a:t>
             </a:r>
             <a:r>
               <a:rPr lang="en-GB" dirty="0"/>
@@ -16031,17 +15962,8 @@
             </a:r>
             <a:r>
               <a:rPr lang="en-GB" dirty="0" smtClean="0"/>
-              <a:t>(extremely </a:t>
-            </a:r>
-            <a:r>
-              <a:rPr lang="en-GB" dirty="0" smtClean="0"/>
-              <a:t>difficult </a:t>
-            </a:r>
-            <a:r>
-              <a:rPr lang="en-GB" dirty="0" smtClean="0"/>
-              <a:t>to hire).</a:t>
-            </a:r>
-            <a:endParaRPr lang="en-GB" dirty="0" smtClean="0"/>
+              <a:t>(extremely difficult to hire).</a:t>
+            </a:r>
           </a:p>
           <a:p>
             <a:pPr marL="0" indent="0">
@@ -16321,7 +16243,6 @@
               <a:rPr lang="en-GB" dirty="0" smtClean="0"/>
               <a:t> </a:t>
             </a:r>
-            <a:endParaRPr lang="en-GB" dirty="0" smtClean="0"/>
           </a:p>
           <a:p>
             <a:r>
@@ -16332,29 +16253,8 @@
           <a:p>
             <a:r>
               <a:rPr lang="en-GB" dirty="0" smtClean="0"/>
-              <a:t>System/network </a:t>
-            </a:r>
-            <a:r>
-              <a:rPr lang="en-GB" dirty="0" smtClean="0"/>
-              <a:t>admin </a:t>
-            </a:r>
-            <a:r>
-              <a:rPr lang="en-GB" dirty="0" smtClean="0"/>
-              <a:t>job </a:t>
-            </a:r>
-            <a:r>
-              <a:rPr lang="en-GB" dirty="0" smtClean="0"/>
-              <a:t>market (extremely </a:t>
-            </a:r>
-            <a:r>
-              <a:rPr lang="en-GB" dirty="0" smtClean="0"/>
-              <a:t>difficult </a:t>
-            </a:r>
-            <a:r>
-              <a:rPr lang="en-GB" dirty="0" smtClean="0"/>
-              <a:t>to hire).</a:t>
-            </a:r>
-            <a:endParaRPr lang="en-GB" dirty="0" smtClean="0"/>
+              <a:t>System/network admin job market (extremely difficult to hire).</a:t>
+            </a:r>
           </a:p>
           <a:p>
             <a:pPr marL="0" indent="0">
@@ -17833,30 +17733,14 @@
             <a:pPr lvl="1"/>
             <a:r>
               <a:rPr lang="en-GB" dirty="0" smtClean="0"/>
-              <a:t>Authentication and Authorisation Infrastructure (AAI): common </a:t>
-            </a:r>
-            <a:r>
-              <a:rPr lang="en-GB" dirty="0" smtClean="0"/>
-              <a:t>user </a:t>
-            </a:r>
-            <a:r>
-              <a:rPr lang="en-GB" dirty="0" smtClean="0"/>
-              <a:t>authentication for all PaNOSC (EOSC?) services</a:t>
+              <a:t>Authentication and Authorisation Infrastructure (AAI): common user authentication for all PaNOSC (EOSC?) services</a:t>
             </a:r>
           </a:p>
           <a:p>
             <a:pPr lvl="1"/>
             <a:r>
               <a:rPr lang="en-GB" dirty="0" smtClean="0"/>
-              <a:t>Data transfer: bringing data to services or vice versa, quest for the right model (depending on </a:t>
-            </a:r>
-            <a:r>
-              <a:rPr lang="en-GB" dirty="0" smtClean="0"/>
-              <a:t>the service </a:t>
-            </a:r>
-            <a:r>
-              <a:rPr lang="en-GB" dirty="0" smtClean="0"/>
-              <a:t>type, data volume, …)</a:t>
+              <a:t>Data transfer: bringing data to services or vice versa, quest for the right model (depending on the service type, data volume, …)</a:t>
             </a:r>
           </a:p>
           <a:p>
@@ -18293,9 +18177,6 @@
               </a:rPr>
               <a:t>data.</a:t>
             </a:r>
-            <a:endParaRPr lang="en-US" sz="2000" dirty="0" smtClean="0">
-              <a:latin typeface="+mj-lt"/>
-            </a:endParaRPr>
           </a:p>
           <a:p>
             <a:pPr marL="457200" lvl="1" indent="0">
@@ -18496,23 +18377,7 @@
             <a:pPr lvl="1"/>
             <a:r>
               <a:rPr lang="en-US" sz="2000" dirty="0" smtClean="0"/>
-              <a:t>Integrate EOSC </a:t>
-            </a:r>
-            <a:r>
-              <a:rPr lang="en-US" sz="2000" dirty="0" smtClean="0"/>
-              <a:t>– I.E. move </a:t>
-            </a:r>
-            <a:r>
-              <a:rPr lang="en-US" sz="2000" dirty="0" smtClean="0"/>
-              <a:t>to </a:t>
-            </a:r>
-            <a:r>
-              <a:rPr lang="en-US" sz="2000" dirty="0" smtClean="0"/>
-              <a:t>the </a:t>
-            </a:r>
-            <a:r>
-              <a:rPr lang="en-US" sz="2000" dirty="0" smtClean="0"/>
-              <a:t>AARC </a:t>
+              <a:t>Integrate EOSC – I.E. move to the AARC </a:t>
             </a:r>
             <a:r>
               <a:rPr lang="en-US" sz="2000" dirty="0" err="1" smtClean="0"/>
@@ -18580,11 +18445,7 @@
             <a:pPr lvl="1"/>
             <a:r>
               <a:rPr lang="en-US" sz="2000" dirty="0" smtClean="0"/>
-              <a:t>Collaborate closely with GÉANT to achieve the above </a:t>
-            </a:r>
-            <a:r>
-              <a:rPr lang="en-US" sz="2000" dirty="0" smtClean="0"/>
-              <a:t>objectives.</a:t>
+              <a:t>Collaborate closely with GÉANT to achieve the above objectives.</a:t>
             </a:r>
             <a:endParaRPr lang="en-US" sz="2000" dirty="0"/>
           </a:p>
@@ -19322,19 +19183,7 @@
           <a:p>
             <a:r>
               <a:rPr lang="en-GB" dirty="0" smtClean="0"/>
-              <a:t>Authenticate users </a:t>
-            </a:r>
-            <a:r>
-              <a:rPr lang="en-GB" dirty="0" smtClean="0"/>
-              <a:t>using </a:t>
-            </a:r>
-            <a:r>
-              <a:rPr lang="en-GB" dirty="0" smtClean="0"/>
-              <a:t>EOSC ready </a:t>
-            </a:r>
-            <a:r>
-              <a:rPr lang="en-GB" dirty="0" smtClean="0"/>
-              <a:t>AAI (</a:t>
+              <a:t>Authenticate users using EOSC ready AAI (</a:t>
             </a:r>
             <a:r>
               <a:rPr lang="en-GB" dirty="0" err="1" smtClean="0"/>
@@ -19344,16 +19193,11 @@
               <a:rPr lang="en-GB" dirty="0" smtClean="0"/>
               <a:t>)</a:t>
             </a:r>
-            <a:endParaRPr lang="en-GB" dirty="0" smtClean="0"/>
           </a:p>
           <a:p>
             <a:r>
               <a:rPr lang="en-GB" dirty="0" smtClean="0"/>
-              <a:t>Authorise data access (open or embargo </a:t>
-            </a:r>
-            <a:r>
-              <a:rPr lang="en-GB" dirty="0" smtClean="0"/>
-              <a:t>data).</a:t>
+              <a:t>Authorise data access (open or embargo data).</a:t>
             </a:r>
             <a:endParaRPr lang="en-GB" dirty="0"/>
           </a:p>
@@ -20877,6 +20721,115 @@
           </a:p>
         </p:txBody>
       </p:sp>
+      <p:grpSp>
+        <p:nvGrpSpPr>
+          <p:cNvPr id="4" name="Groupe 3"/>
+          <p:cNvGrpSpPr/>
+          <p:nvPr/>
+        </p:nvGrpSpPr>
+        <p:grpSpPr>
+          <a:xfrm>
+            <a:off x="263352" y="3803935"/>
+            <a:ext cx="626282" cy="2074666"/>
+            <a:chOff x="263352" y="3803935"/>
+            <a:chExt cx="626282" cy="2074666"/>
+          </a:xfrm>
+        </p:grpSpPr>
+        <p:pic>
+          <p:nvPicPr>
+            <p:cNvPr id="2" name="Image 1"/>
+            <p:cNvPicPr>
+              <a:picLocks noChangeAspect="1"/>
+            </p:cNvPicPr>
+            <p:nvPr/>
+          </p:nvPicPr>
+          <p:blipFill rotWithShape="1">
+            <a:blip r:embed="rId22">
+              <a:clrChange>
+                <a:clrFrom>
+                  <a:srgbClr val="FEFEFE"/>
+                </a:clrFrom>
+                <a:clrTo>
+                  <a:srgbClr val="FEFEFE">
+                    <a:alpha val="0"/>
+                  </a:srgbClr>
+                </a:clrTo>
+              </a:clrChange>
+            </a:blip>
+            <a:srcRect l="1929" t="39423" r="2628" b="44512"/>
+            <a:stretch/>
+          </p:blipFill>
+          <p:spPr>
+            <a:xfrm rot="16200000">
+              <a:off x="-599380" y="4666667"/>
+              <a:ext cx="2074666" cy="349201"/>
+            </a:xfrm>
+            <a:prstGeom prst="rect">
+              <a:avLst/>
+            </a:prstGeom>
+          </p:spPr>
+        </p:pic>
+        <p:sp>
+          <p:nvSpPr>
+            <p:cNvPr id="3" name="ZoneTexte 2"/>
+            <p:cNvSpPr txBox="1"/>
+            <p:nvPr/>
+          </p:nvSpPr>
+          <p:spPr>
+            <a:xfrm rot="16200000">
+              <a:off x="157863" y="4791353"/>
+              <a:ext cx="1186543" cy="276999"/>
+            </a:xfrm>
+            <a:prstGeom prst="rect">
+              <a:avLst/>
+            </a:prstGeom>
+            <a:noFill/>
+          </p:spPr>
+          <p:txBody>
+            <a:bodyPr wrap="none" rtlCol="0">
+              <a:spAutoFit/>
+            </a:bodyPr>
+            <a:lstStyle/>
+            <a:p>
+              <a:r>
+                <a:rPr lang="en-GB" sz="1200" dirty="0" smtClean="0"/>
+                <a:t>Local network</a:t>
+              </a:r>
+              <a:endParaRPr lang="en-GB" sz="1200" dirty="0"/>
+            </a:p>
+          </p:txBody>
+        </p:sp>
+      </p:grpSp>
+      <p:sp>
+        <p:nvSpPr>
+          <p:cNvPr id="33" name="ZoneTexte 32"/>
+          <p:cNvSpPr txBox="1"/>
+          <p:nvPr/>
+        </p:nvSpPr>
+        <p:spPr>
+          <a:xfrm rot="20857638">
+            <a:off x="7146001" y="5218721"/>
+            <a:ext cx="2111475" cy="276999"/>
+          </a:xfrm>
+          <a:prstGeom prst="rect">
+            <a:avLst/>
+          </a:prstGeom>
+          <a:noFill/>
+        </p:spPr>
+        <p:txBody>
+          <a:bodyPr wrap="none" rtlCol="0">
+            <a:spAutoFit/>
+          </a:bodyPr>
+          <a:lstStyle/>
+          <a:p>
+            <a:r>
+              <a:rPr lang="en-GB" sz="1200" dirty="0" smtClean="0"/>
+              <a:t>GÉANT network (100’s km)</a:t>
+            </a:r>
+            <a:endParaRPr lang="en-GB" sz="1200" dirty="0"/>
+          </a:p>
+        </p:txBody>
+      </p:sp>
     </p:spTree>
     <p:extLst>
       <p:ext uri="{BB962C8B-B14F-4D97-AF65-F5344CB8AC3E}">
@@ -21015,39 +20968,21 @@
                                   </p:childTnLst>
                                 </p:cTn>
                               </p:par>
-                            </p:childTnLst>
-                          </p:cTn>
-                        </p:par>
-                      </p:childTnLst>
-                    </p:cTn>
-                  </p:par>
-                  <p:par>
-                    <p:cTn id="13" fill="hold">
-                      <p:stCondLst>
-                        <p:cond delay="indefinite"/>
-                      </p:stCondLst>
-                      <p:childTnLst>
-                        <p:par>
-                          <p:cTn id="14" fill="hold">
-                            <p:stCondLst>
-                              <p:cond delay="0"/>
-                            </p:stCondLst>
-                            <p:childTnLst>
                               <p:par>
-                                <p:cTn id="15" presetID="1" presetClass="entr" presetSubtype="0" fill="hold" grpId="0" nodeType="clickEffect">
+                                <p:cTn id="13" presetID="1" presetClass="entr" presetSubtype="0" fill="hold" nodeType="withEffect">
                                   <p:stCondLst>
                                     <p:cond delay="0"/>
                                   </p:stCondLst>
                                   <p:childTnLst>
                                     <p:set>
                                       <p:cBhvr>
-                                        <p:cTn id="16" dur="1" fill="hold">
+                                        <p:cTn id="14" dur="1" fill="hold">
                                           <p:stCondLst>
                                             <p:cond delay="0"/>
                                           </p:stCondLst>
                                         </p:cTn>
                                         <p:tgtEl>
-                                          <p:spTgt spid="24"/>
+                                          <p:spTgt spid="4"/>
                                         </p:tgtEl>
                                         <p:attrNameLst>
                                           <p:attrName>style.visibility</p:attrName>
@@ -21060,8 +20995,26 @@
                                   </p:childTnLst>
                                 </p:cTn>
                               </p:par>
+                            </p:childTnLst>
+                          </p:cTn>
+                        </p:par>
+                      </p:childTnLst>
+                    </p:cTn>
+                  </p:par>
+                  <p:par>
+                    <p:cTn id="15" fill="hold">
+                      <p:stCondLst>
+                        <p:cond delay="indefinite"/>
+                      </p:stCondLst>
+                      <p:childTnLst>
+                        <p:par>
+                          <p:cTn id="16" fill="hold">
+                            <p:stCondLst>
+                              <p:cond delay="0"/>
+                            </p:stCondLst>
+                            <p:childTnLst>
                               <p:par>
-                                <p:cTn id="17" presetID="1" presetClass="entr" presetSubtype="0" fill="hold" grpId="0" nodeType="withEffect">
+                                <p:cTn id="17" presetID="1" presetClass="entr" presetSubtype="0" fill="hold" grpId="0" nodeType="clickEffect">
                                   <p:stCondLst>
                                     <p:cond delay="0"/>
                                   </p:stCondLst>
@@ -21074,7 +21027,7 @@
                                           </p:stCondLst>
                                         </p:cTn>
                                         <p:tgtEl>
-                                          <p:spTgt spid="25"/>
+                                          <p:spTgt spid="24"/>
                                         </p:tgtEl>
                                         <p:attrNameLst>
                                           <p:attrName>style.visibility</p:attrName>
@@ -21101,7 +21054,7 @@
                                           </p:stCondLst>
                                         </p:cTn>
                                         <p:tgtEl>
-                                          <p:spTgt spid="26"/>
+                                          <p:spTgt spid="25"/>
                                         </p:tgtEl>
                                         <p:attrNameLst>
                                           <p:attrName>style.visibility</p:attrName>
@@ -21128,6 +21081,33 @@
                                           </p:stCondLst>
                                         </p:cTn>
                                         <p:tgtEl>
+                                          <p:spTgt spid="26"/>
+                                        </p:tgtEl>
+                                        <p:attrNameLst>
+                                          <p:attrName>style.visibility</p:attrName>
+                                        </p:attrNameLst>
+                                      </p:cBhvr>
+                                      <p:to>
+                                        <p:strVal val="visible"/>
+                                      </p:to>
+                                    </p:set>
+                                  </p:childTnLst>
+                                </p:cTn>
+                              </p:par>
+                              <p:par>
+                                <p:cTn id="23" presetID="1" presetClass="entr" presetSubtype="0" fill="hold" grpId="0" nodeType="withEffect">
+                                  <p:stCondLst>
+                                    <p:cond delay="0"/>
+                                  </p:stCondLst>
+                                  <p:childTnLst>
+                                    <p:set>
+                                      <p:cBhvr>
+                                        <p:cTn id="24" dur="1" fill="hold">
+                                          <p:stCondLst>
+                                            <p:cond delay="0"/>
+                                          </p:stCondLst>
+                                        </p:cTn>
+                                        <p:tgtEl>
                                           <p:spTgt spid="23"/>
                                         </p:tgtEl>
                                         <p:attrNameLst>
@@ -21142,34 +21122,7 @@
                                 </p:cTn>
                               </p:par>
                               <p:par>
-                                <p:cTn id="23" presetID="1" presetClass="entr" presetSubtype="0" fill="hold" nodeType="withEffect">
-                                  <p:stCondLst>
-                                    <p:cond delay="0"/>
-                                  </p:stCondLst>
-                                  <p:childTnLst>
-                                    <p:set>
-                                      <p:cBhvr>
-                                        <p:cTn id="24" dur="1" fill="hold">
-                                          <p:stCondLst>
-                                            <p:cond delay="0"/>
-                                          </p:stCondLst>
-                                        </p:cTn>
-                                        <p:tgtEl>
-                                          <p:spTgt spid="28"/>
-                                        </p:tgtEl>
-                                        <p:attrNameLst>
-                                          <p:attrName>style.visibility</p:attrName>
-                                        </p:attrNameLst>
-                                      </p:cBhvr>
-                                      <p:to>
-                                        <p:strVal val="visible"/>
-                                      </p:to>
-                                    </p:set>
-                                  </p:childTnLst>
-                                </p:cTn>
-                              </p:par>
-                              <p:par>
-                                <p:cTn id="25" presetID="1" presetClass="entr" presetSubtype="0" fill="hold" grpId="0" nodeType="withEffect">
+                                <p:cTn id="25" presetID="1" presetClass="entr" presetSubtype="0" fill="hold" nodeType="withEffect">
                                   <p:stCondLst>
                                     <p:cond delay="0"/>
                                   </p:stCondLst>
@@ -21182,7 +21135,7 @@
                                           </p:stCondLst>
                                         </p:cTn>
                                         <p:tgtEl>
-                                          <p:spTgt spid="21"/>
+                                          <p:spTgt spid="28"/>
                                         </p:tgtEl>
                                         <p:attrNameLst>
                                           <p:attrName>style.visibility</p:attrName>
@@ -21209,7 +21162,7 @@
                                           </p:stCondLst>
                                         </p:cTn>
                                         <p:tgtEl>
-                                          <p:spTgt spid="22"/>
+                                          <p:spTgt spid="21"/>
                                         </p:tgtEl>
                                         <p:attrNameLst>
                                           <p:attrName>style.visibility</p:attrName>
@@ -21236,7 +21189,7 @@
                                           </p:stCondLst>
                                         </p:cTn>
                                         <p:tgtEl>
-                                          <p:spTgt spid="20"/>
+                                          <p:spTgt spid="22"/>
                                         </p:tgtEl>
                                         <p:attrNameLst>
                                           <p:attrName>style.visibility</p:attrName>
@@ -21263,6 +21216,33 @@
                                           </p:stCondLst>
                                         </p:cTn>
                                         <p:tgtEl>
+                                          <p:spTgt spid="20"/>
+                                        </p:tgtEl>
+                                        <p:attrNameLst>
+                                          <p:attrName>style.visibility</p:attrName>
+                                        </p:attrNameLst>
+                                      </p:cBhvr>
+                                      <p:to>
+                                        <p:strVal val="visible"/>
+                                      </p:to>
+                                    </p:set>
+                                  </p:childTnLst>
+                                </p:cTn>
+                              </p:par>
+                              <p:par>
+                                <p:cTn id="33" presetID="1" presetClass="entr" presetSubtype="0" fill="hold" grpId="0" nodeType="withEffect">
+                                  <p:stCondLst>
+                                    <p:cond delay="0"/>
+                                  </p:stCondLst>
+                                  <p:childTnLst>
+                                    <p:set>
+                                      <p:cBhvr>
+                                        <p:cTn id="34" dur="1" fill="hold">
+                                          <p:stCondLst>
+                                            <p:cond delay="0"/>
+                                          </p:stCondLst>
+                                        </p:cTn>
+                                        <p:tgtEl>
                                           <p:spTgt spid="27"/>
                                         </p:tgtEl>
                                         <p:attrNameLst>
@@ -21277,20 +21257,47 @@
                                 </p:cTn>
                               </p:par>
                               <p:par>
-                                <p:cTn id="33" presetID="1" presetClass="entr" presetSubtype="0" fill="hold" nodeType="withEffect">
+                                <p:cTn id="35" presetID="1" presetClass="entr" presetSubtype="0" fill="hold" nodeType="withEffect">
                                   <p:stCondLst>
                                     <p:cond delay="0"/>
                                   </p:stCondLst>
                                   <p:childTnLst>
                                     <p:set>
                                       <p:cBhvr>
-                                        <p:cTn id="34" dur="1" fill="hold">
+                                        <p:cTn id="36" dur="1" fill="hold">
                                           <p:stCondLst>
                                             <p:cond delay="0"/>
                                           </p:stCondLst>
                                         </p:cTn>
                                         <p:tgtEl>
                                           <p:spTgt spid="31"/>
+                                        </p:tgtEl>
+                                        <p:attrNameLst>
+                                          <p:attrName>style.visibility</p:attrName>
+                                        </p:attrNameLst>
+                                      </p:cBhvr>
+                                      <p:to>
+                                        <p:strVal val="visible"/>
+                                      </p:to>
+                                    </p:set>
+                                  </p:childTnLst>
+                                </p:cTn>
+                              </p:par>
+                              <p:par>
+                                <p:cTn id="37" presetID="1" presetClass="entr" presetSubtype="0" fill="hold" grpId="0" nodeType="withEffect">
+                                  <p:stCondLst>
+                                    <p:cond delay="0"/>
+                                  </p:stCondLst>
+                                  <p:childTnLst>
+                                    <p:set>
+                                      <p:cBhvr>
+                                        <p:cTn id="38" dur="1" fill="hold">
+                                          <p:stCondLst>
+                                            <p:cond delay="0"/>
+                                          </p:stCondLst>
+                                        </p:cTn>
+                                        <p:tgtEl>
+                                          <p:spTgt spid="33"/>
                                         </p:tgtEl>
                                         <p:attrNameLst>
                                           <p:attrName>style.visibility</p:attrName>
@@ -21339,6 +21346,7 @@
       <p:bldP spid="25" grpId="0" animBg="1"/>
       <p:bldP spid="26" grpId="0" animBg="1"/>
       <p:bldP spid="27" grpId="0"/>
+      <p:bldP spid="33" grpId="0"/>
     </p:bldLst>
   </p:timing>
 </p:sld>
@@ -21469,19 +21477,7 @@
               <a:rPr lang="en-GB" sz="2000" dirty="0" smtClean="0">
                 <a:latin typeface="Muli Black" panose="00000A00000000000000" pitchFamily="2" charset="0"/>
               </a:rPr>
-              <a:t> model not ready for such </a:t>
-            </a:r>
-            <a:r>
-              <a:rPr lang="en-GB" sz="2000" dirty="0" smtClean="0">
-                <a:latin typeface="Muli Black" panose="00000A00000000000000" pitchFamily="2" charset="0"/>
-              </a:rPr>
-              <a:t>a cross </a:t>
-            </a:r>
-            <a:r>
-              <a:rPr lang="en-GB" sz="2000" dirty="0" smtClean="0">
-                <a:latin typeface="Muli Black" panose="00000A00000000000000" pitchFamily="2" charset="0"/>
-              </a:rPr>
-              <a:t>community use case (the UC has been transferred to the EOSC Architecture WG).</a:t>
+              <a:t> model not ready for such a cross community use case (the UC has been transferred to the EOSC Architecture WG).</a:t>
             </a:r>
           </a:p>
           <a:p>
@@ -22063,9 +22059,6 @@
                     <p:cTn id="3" fill="hold">
                       <p:stCondLst>
                         <p:cond delay="indefinite"/>
-                        <p:cond evt="onBegin" delay="0">
-                          <p:tn val="2"/>
-                        </p:cond>
                       </p:stCondLst>
                       <p:childTnLst>
                         <p:par>
@@ -22075,7 +22068,7 @@
                             </p:stCondLst>
                             <p:childTnLst>
                               <p:par>
-                                <p:cTn id="5" presetID="1" presetClass="entr" presetSubtype="0" fill="hold" grpId="0" nodeType="withEffect">
+                                <p:cTn id="5" presetID="1" presetClass="exit" presetSubtype="0" fill="hold" nodeType="clickEffect">
                                   <p:stCondLst>
                                     <p:cond delay="0"/>
                                   </p:stCondLst>
@@ -22083,159 +22076,6 @@
                                     <p:set>
                                       <p:cBhvr>
                                         <p:cTn id="6" dur="1" fill="hold">
-                                          <p:stCondLst>
-                                            <p:cond delay="0"/>
-                                          </p:stCondLst>
-                                        </p:cTn>
-                                        <p:tgtEl>
-                                          <p:spTgt spid="10"/>
-                                        </p:tgtEl>
-                                        <p:attrNameLst>
-                                          <p:attrName>style.visibility</p:attrName>
-                                        </p:attrNameLst>
-                                      </p:cBhvr>
-                                      <p:to>
-                                        <p:strVal val="visible"/>
-                                      </p:to>
-                                    </p:set>
-                                  </p:childTnLst>
-                                </p:cTn>
-                              </p:par>
-                              <p:par>
-                                <p:cTn id="7" presetID="1" presetClass="entr" presetSubtype="0" fill="hold" nodeType="withEffect">
-                                  <p:stCondLst>
-                                    <p:cond delay="0"/>
-                                  </p:stCondLst>
-                                  <p:childTnLst>
-                                    <p:set>
-                                      <p:cBhvr>
-                                        <p:cTn id="8" dur="1" fill="hold">
-                                          <p:stCondLst>
-                                            <p:cond delay="0"/>
-                                          </p:stCondLst>
-                                        </p:cTn>
-                                        <p:tgtEl>
-                                          <p:spTgt spid="11"/>
-                                        </p:tgtEl>
-                                        <p:attrNameLst>
-                                          <p:attrName>style.visibility</p:attrName>
-                                        </p:attrNameLst>
-                                      </p:cBhvr>
-                                      <p:to>
-                                        <p:strVal val="visible"/>
-                                      </p:to>
-                                    </p:set>
-                                  </p:childTnLst>
-                                </p:cTn>
-                              </p:par>
-                              <p:par>
-                                <p:cTn id="9" presetID="1" presetClass="entr" presetSubtype="0" fill="hold" grpId="0" nodeType="withEffect">
-                                  <p:stCondLst>
-                                    <p:cond delay="0"/>
-                                  </p:stCondLst>
-                                  <p:childTnLst>
-                                    <p:set>
-                                      <p:cBhvr>
-                                        <p:cTn id="10" dur="1" fill="hold">
-                                          <p:stCondLst>
-                                            <p:cond delay="0"/>
-                                          </p:stCondLst>
-                                        </p:cTn>
-                                        <p:tgtEl>
-                                          <p:spTgt spid="8"/>
-                                        </p:tgtEl>
-                                        <p:attrNameLst>
-                                          <p:attrName>style.visibility</p:attrName>
-                                        </p:attrNameLst>
-                                      </p:cBhvr>
-                                      <p:to>
-                                        <p:strVal val="visible"/>
-                                      </p:to>
-                                    </p:set>
-                                  </p:childTnLst>
-                                </p:cTn>
-                              </p:par>
-                              <p:par>
-                                <p:cTn id="11" presetID="1" presetClass="entr" presetSubtype="0" fill="hold" grpId="0" nodeType="withEffect">
-                                  <p:stCondLst>
-                                    <p:cond delay="0"/>
-                                  </p:stCondLst>
-                                  <p:childTnLst>
-                                    <p:set>
-                                      <p:cBhvr>
-                                        <p:cTn id="12" dur="1" fill="hold">
-                                          <p:stCondLst>
-                                            <p:cond delay="0"/>
-                                          </p:stCondLst>
-                                        </p:cTn>
-                                        <p:tgtEl>
-                                          <p:spTgt spid="9"/>
-                                        </p:tgtEl>
-                                        <p:attrNameLst>
-                                          <p:attrName>style.visibility</p:attrName>
-                                        </p:attrNameLst>
-                                      </p:cBhvr>
-                                      <p:to>
-                                        <p:strVal val="visible"/>
-                                      </p:to>
-                                    </p:set>
-                                  </p:childTnLst>
-                                </p:cTn>
-                              </p:par>
-                              <p:par>
-                                <p:cTn id="13" presetID="1" presetClass="entr" presetSubtype="0" fill="hold" grpId="0" nodeType="withEffect">
-                                  <p:stCondLst>
-                                    <p:cond delay="0"/>
-                                  </p:stCondLst>
-                                  <p:childTnLst>
-                                    <p:set>
-                                      <p:cBhvr>
-                                        <p:cTn id="14" dur="1" fill="hold">
-                                          <p:stCondLst>
-                                            <p:cond delay="0"/>
-                                          </p:stCondLst>
-                                        </p:cTn>
-                                        <p:tgtEl>
-                                          <p:spTgt spid="7"/>
-                                        </p:tgtEl>
-                                        <p:attrNameLst>
-                                          <p:attrName>style.visibility</p:attrName>
-                                        </p:attrNameLst>
-                                      </p:cBhvr>
-                                      <p:to>
-                                        <p:strVal val="visible"/>
-                                      </p:to>
-                                    </p:set>
-                                  </p:childTnLst>
-                                </p:cTn>
-                              </p:par>
-                            </p:childTnLst>
-                          </p:cTn>
-                        </p:par>
-                      </p:childTnLst>
-                    </p:cTn>
-                  </p:par>
-                  <p:par>
-                    <p:cTn id="15" fill="hold">
-                      <p:stCondLst>
-                        <p:cond delay="indefinite"/>
-                      </p:stCondLst>
-                      <p:childTnLst>
-                        <p:par>
-                          <p:cTn id="16" fill="hold">
-                            <p:stCondLst>
-                              <p:cond delay="0"/>
-                            </p:stCondLst>
-                            <p:childTnLst>
-                              <p:par>
-                                <p:cTn id="17" presetID="1" presetClass="exit" presetSubtype="0" fill="hold" nodeType="clickEffect">
-                                  <p:stCondLst>
-                                    <p:cond delay="0"/>
-                                  </p:stCondLst>
-                                  <p:childTnLst>
-                                    <p:set>
-                                      <p:cBhvr>
-                                        <p:cTn id="18" dur="1" fill="hold">
                                           <p:stCondLst>
                                             <p:cond delay="0"/>
                                           </p:stCondLst>
@@ -22254,33 +22094,15 @@
                                   </p:childTnLst>
                                 </p:cTn>
                               </p:par>
-                            </p:childTnLst>
-                          </p:cTn>
-                        </p:par>
-                      </p:childTnLst>
-                    </p:cTn>
-                  </p:par>
-                  <p:par>
-                    <p:cTn id="19" fill="hold">
-                      <p:stCondLst>
-                        <p:cond delay="indefinite"/>
-                      </p:stCondLst>
-                      <p:childTnLst>
-                        <p:par>
-                          <p:cTn id="20" fill="hold">
-                            <p:stCondLst>
-                              <p:cond delay="0"/>
-                            </p:stCondLst>
-                            <p:childTnLst>
                               <p:par>
-                                <p:cTn id="21" presetID="1" presetClass="entr" presetSubtype="0" fill="hold" nodeType="clickEffect">
+                                <p:cTn id="7" presetID="1" presetClass="entr" presetSubtype="0" fill="hold" nodeType="withEffect">
                                   <p:stCondLst>
-                                    <p:cond delay="0"/>
+                                    <p:cond delay="500"/>
                                   </p:stCondLst>
                                   <p:childTnLst>
                                     <p:set>
                                       <p:cBhvr>
-                                        <p:cTn id="22" dur="1" fill="hold">
+                                        <p:cTn id="8" dur="1" fill="hold">
                                           <p:stCondLst>
                                             <p:cond delay="0"/>
                                           </p:stCondLst>
@@ -22326,12 +22148,6 @@
         </p:cTn>
       </p:par>
     </p:tnLst>
-    <p:bldLst>
-      <p:bldP spid="7" grpId="0" animBg="1"/>
-      <p:bldP spid="8" grpId="0" animBg="1"/>
-      <p:bldP spid="9" grpId="0" animBg="1"/>
-      <p:bldP spid="10" grpId="0" animBg="1"/>
-    </p:bldLst>
   </p:timing>
 </p:sld>
 </file>

</xml_diff>